<commit_message>
modern cnn architectures lecture
</commit_message>
<xml_diff>
--- a/mylearnings/mylecturenotes/ModernCNNArchitectures.pptx
+++ b/mylearnings/mylecturenotes/ModernCNNArchitectures.pptx
@@ -11,8 +11,12 @@
     <p:sldId id="259" r:id="rId5"/>
     <p:sldId id="260" r:id="rId6"/>
     <p:sldId id="261" r:id="rId7"/>
-    <p:sldId id="263" r:id="rId8"/>
-    <p:sldId id="262" r:id="rId9"/>
+    <p:sldId id="264" r:id="rId8"/>
+    <p:sldId id="263" r:id="rId9"/>
+    <p:sldId id="262" r:id="rId10"/>
+    <p:sldId id="265" r:id="rId11"/>
+    <p:sldId id="266" r:id="rId12"/>
+    <p:sldId id="267" r:id="rId13"/>
   </p:sldIdLst>
   <p:sldSz cx="12192000" cy="6858000"/>
   <p:notesSz cx="6858000" cy="9144000"/>
@@ -3394,6 +3398,768 @@
 </p:sld>
 </file>
 
+<file path=ppt/slides/slide10.xml><?xml version="1.0" encoding="utf-8"?>
+<p:sld xmlns:a="http://schemas.openxmlformats.org/drawingml/2006/main" xmlns:r="http://schemas.openxmlformats.org/officeDocument/2006/relationships" xmlns:p="http://schemas.openxmlformats.org/presentationml/2006/main">
+  <p:cSld>
+    <p:spTree>
+      <p:nvGrpSpPr>
+        <p:cNvPr id="1" name=""/>
+        <p:cNvGrpSpPr/>
+        <p:nvPr/>
+      </p:nvGrpSpPr>
+      <p:grpSpPr>
+        <a:xfrm>
+          <a:off x="0" y="0"/>
+          <a:ext cx="0" cy="0"/>
+          <a:chOff x="0" y="0"/>
+          <a:chExt cx="0" cy="0"/>
+        </a:xfrm>
+      </p:grpSpPr>
+      <p:sp>
+        <p:nvSpPr>
+          <p:cNvPr id="2" name="Title 1">
+            <a:extLst>
+              <a:ext uri="{FF2B5EF4-FFF2-40B4-BE49-F238E27FC236}">
+                <a16:creationId xmlns:a16="http://schemas.microsoft.com/office/drawing/2014/main" id="{2420A844-506F-8973-7E6C-3DD3F83223B9}"/>
+              </a:ext>
+            </a:extLst>
+          </p:cNvPr>
+          <p:cNvSpPr>
+            <a:spLocks noGrp="1"/>
+          </p:cNvSpPr>
+          <p:nvPr>
+            <p:ph type="title"/>
+          </p:nvPr>
+        </p:nvSpPr>
+        <p:spPr>
+          <a:xfrm>
+            <a:off x="280639" y="306504"/>
+            <a:ext cx="10515600" cy="671938"/>
+          </a:xfrm>
+        </p:spPr>
+        <p:txBody>
+          <a:bodyPr>
+            <a:normAutofit fontScale="90000"/>
+          </a:bodyPr>
+          <a:lstStyle/>
+          <a:p>
+            <a:r>
+              <a:rPr lang="en-US" dirty="0"/>
+              <a:t>High level overview </a:t>
+            </a:r>
+          </a:p>
+        </p:txBody>
+      </p:sp>
+      <p:sp>
+        <p:nvSpPr>
+          <p:cNvPr id="3" name="Content Placeholder 2">
+            <a:extLst>
+              <a:ext uri="{FF2B5EF4-FFF2-40B4-BE49-F238E27FC236}">
+                <a16:creationId xmlns:a16="http://schemas.microsoft.com/office/drawing/2014/main" id="{3CE3DE5F-811F-927E-BE6B-AC5323AAC54F}"/>
+              </a:ext>
+            </a:extLst>
+          </p:cNvPr>
+          <p:cNvSpPr>
+            <a:spLocks noGrp="1"/>
+          </p:cNvSpPr>
+          <p:nvPr>
+            <p:ph idx="1"/>
+          </p:nvPr>
+        </p:nvSpPr>
+        <p:spPr>
+          <a:xfrm>
+            <a:off x="838200" y="1393902"/>
+            <a:ext cx="10515600" cy="5098973"/>
+          </a:xfrm>
+        </p:spPr>
+        <p:txBody>
+          <a:bodyPr>
+            <a:normAutofit fontScale="92500" lnSpcReduction="20000"/>
+          </a:bodyPr>
+          <a:lstStyle/>
+          <a:p>
+            <a:pPr algn="just">
+              <a:lnSpc>
+                <a:spcPct val="170000"/>
+              </a:lnSpc>
+            </a:pPr>
+            <a:r>
+              <a:rPr lang="en-US" sz="1600" b="0" i="0" dirty="0">
+                <a:effectLst/>
+                <a:latin typeface="Calibri" panose="020F0502020204030204" pitchFamily="34" charset="0"/>
+                <a:cs typeface="Calibri" panose="020F0502020204030204" pitchFamily="34" charset="0"/>
+              </a:rPr>
+              <a:t>Since </a:t>
+            </a:r>
+            <a:r>
+              <a:rPr lang="en-US" sz="1600" b="0" i="0" dirty="0" err="1">
+                <a:effectLst/>
+                <a:latin typeface="Calibri" panose="020F0502020204030204" pitchFamily="34" charset="0"/>
+                <a:cs typeface="Calibri" panose="020F0502020204030204" pitchFamily="34" charset="0"/>
+              </a:rPr>
+              <a:t>AlexNet</a:t>
+            </a:r>
+            <a:r>
+              <a:rPr lang="en-US" sz="1600" b="0" i="0" dirty="0">
+                <a:effectLst/>
+                <a:latin typeface="Calibri" panose="020F0502020204030204" pitchFamily="34" charset="0"/>
+                <a:cs typeface="Calibri" panose="020F0502020204030204" pitchFamily="34" charset="0"/>
+              </a:rPr>
+              <a:t> beat conventional computer vision models on ImageNet, it became popular to construct very deep networks by stacking blocks of convolutions, all designed by the same pattern. </a:t>
+            </a:r>
+          </a:p>
+          <a:p>
+            <a:pPr algn="just">
+              <a:lnSpc>
+                <a:spcPct val="170000"/>
+              </a:lnSpc>
+            </a:pPr>
+            <a:r>
+              <a:rPr lang="en-US" sz="1600" b="0" i="0" dirty="0">
+                <a:effectLst/>
+                <a:latin typeface="Calibri" panose="020F0502020204030204" pitchFamily="34" charset="0"/>
+                <a:cs typeface="Calibri" panose="020F0502020204030204" pitchFamily="34" charset="0"/>
+              </a:rPr>
+              <a:t>In particular, 3×3 convolutions were popularized by VGG networks.</a:t>
+            </a:r>
+          </a:p>
+          <a:p>
+            <a:pPr algn="just">
+              <a:lnSpc>
+                <a:spcPct val="170000"/>
+              </a:lnSpc>
+            </a:pPr>
+            <a:r>
+              <a:rPr lang="en-US" sz="1600" b="0" i="0" dirty="0">
+                <a:effectLst/>
+                <a:latin typeface="Calibri" panose="020F0502020204030204" pitchFamily="34" charset="0"/>
+                <a:cs typeface="Calibri" panose="020F0502020204030204" pitchFamily="34" charset="0"/>
+              </a:rPr>
+              <a:t> </a:t>
+            </a:r>
+            <a:r>
+              <a:rPr lang="en-US" sz="1600" b="0" i="0" dirty="0" err="1">
+                <a:effectLst/>
+                <a:latin typeface="Calibri" panose="020F0502020204030204" pitchFamily="34" charset="0"/>
+                <a:cs typeface="Calibri" panose="020F0502020204030204" pitchFamily="34" charset="0"/>
+              </a:rPr>
+              <a:t>NiN</a:t>
+            </a:r>
+            <a:r>
+              <a:rPr lang="en-US" sz="1600" b="0" i="0" dirty="0">
+                <a:effectLst/>
+                <a:latin typeface="Calibri" panose="020F0502020204030204" pitchFamily="34" charset="0"/>
+                <a:cs typeface="Calibri" panose="020F0502020204030204" pitchFamily="34" charset="0"/>
+              </a:rPr>
+              <a:t>  showed that even 1×1 convolutions could be beneficial by adding local nonlinearities. Moreover, </a:t>
+            </a:r>
+            <a:r>
+              <a:rPr lang="en-US" sz="1600" b="0" i="0" dirty="0" err="1">
+                <a:effectLst/>
+                <a:latin typeface="Calibri" panose="020F0502020204030204" pitchFamily="34" charset="0"/>
+                <a:cs typeface="Calibri" panose="020F0502020204030204" pitchFamily="34" charset="0"/>
+              </a:rPr>
+              <a:t>NiN</a:t>
+            </a:r>
+            <a:r>
+              <a:rPr lang="en-US" sz="1600" b="0" i="0" dirty="0">
+                <a:effectLst/>
+                <a:latin typeface="Calibri" panose="020F0502020204030204" pitchFamily="34" charset="0"/>
+                <a:cs typeface="Calibri" panose="020F0502020204030204" pitchFamily="34" charset="0"/>
+              </a:rPr>
+              <a:t> solved the problem of aggregating information at the head of a network by aggregation across all locations.</a:t>
+            </a:r>
+          </a:p>
+          <a:p>
+            <a:pPr algn="just">
+              <a:lnSpc>
+                <a:spcPct val="170000"/>
+              </a:lnSpc>
+            </a:pPr>
+            <a:r>
+              <a:rPr lang="en-US" sz="1600" b="0" i="0" dirty="0">
+                <a:effectLst/>
+                <a:latin typeface="Calibri" panose="020F0502020204030204" pitchFamily="34" charset="0"/>
+                <a:cs typeface="Calibri" panose="020F0502020204030204" pitchFamily="34" charset="0"/>
+              </a:rPr>
+              <a:t> </a:t>
+            </a:r>
+            <a:r>
+              <a:rPr lang="en-US" sz="1600" b="0" i="0" dirty="0" err="1">
+                <a:effectLst/>
+                <a:latin typeface="Calibri" panose="020F0502020204030204" pitchFamily="34" charset="0"/>
+                <a:cs typeface="Calibri" panose="020F0502020204030204" pitchFamily="34" charset="0"/>
+              </a:rPr>
+              <a:t>GoogLeNet</a:t>
+            </a:r>
+            <a:r>
+              <a:rPr lang="en-US" sz="1600" b="0" i="0" dirty="0">
+                <a:effectLst/>
+                <a:latin typeface="Calibri" panose="020F0502020204030204" pitchFamily="34" charset="0"/>
+                <a:cs typeface="Calibri" panose="020F0502020204030204" pitchFamily="34" charset="0"/>
+              </a:rPr>
+              <a:t>  added multiple branches of different convolution width, combining the advantages of VGG and </a:t>
+            </a:r>
+            <a:r>
+              <a:rPr lang="en-US" sz="1600" b="0" i="0" dirty="0" err="1">
+                <a:effectLst/>
+                <a:latin typeface="Calibri" panose="020F0502020204030204" pitchFamily="34" charset="0"/>
+                <a:cs typeface="Calibri" panose="020F0502020204030204" pitchFamily="34" charset="0"/>
+              </a:rPr>
+              <a:t>NiN</a:t>
+            </a:r>
+            <a:r>
+              <a:rPr lang="en-US" sz="1600" b="0" i="0" dirty="0">
+                <a:effectLst/>
+                <a:latin typeface="Calibri" panose="020F0502020204030204" pitchFamily="34" charset="0"/>
+                <a:cs typeface="Calibri" panose="020F0502020204030204" pitchFamily="34" charset="0"/>
+              </a:rPr>
+              <a:t> in its Inception block. </a:t>
+            </a:r>
+          </a:p>
+          <a:p>
+            <a:pPr algn="just">
+              <a:lnSpc>
+                <a:spcPct val="170000"/>
+              </a:lnSpc>
+            </a:pPr>
+            <a:r>
+              <a:rPr lang="en-US" sz="1600" b="0" i="0" dirty="0" err="1">
+                <a:effectLst/>
+                <a:latin typeface="Calibri" panose="020F0502020204030204" pitchFamily="34" charset="0"/>
+                <a:cs typeface="Calibri" panose="020F0502020204030204" pitchFamily="34" charset="0"/>
+              </a:rPr>
+              <a:t>ResNets</a:t>
+            </a:r>
+            <a:r>
+              <a:rPr lang="en-US" sz="1600" b="0" i="0" dirty="0">
+                <a:effectLst/>
+                <a:latin typeface="Calibri" panose="020F0502020204030204" pitchFamily="34" charset="0"/>
+                <a:cs typeface="Calibri" panose="020F0502020204030204" pitchFamily="34" charset="0"/>
+              </a:rPr>
+              <a:t>  changed the inductive bias towards the identity mapping (from f(</a:t>
+            </a:r>
+            <a:r>
+              <a:rPr lang="en-US" sz="1600" dirty="0">
+                <a:latin typeface="Calibri" panose="020F0502020204030204" pitchFamily="34" charset="0"/>
+                <a:cs typeface="Calibri" panose="020F0502020204030204" pitchFamily="34" charset="0"/>
+              </a:rPr>
+              <a:t>x</a:t>
+            </a:r>
+            <a:r>
+              <a:rPr lang="en-US" sz="1600" b="0" i="0" dirty="0">
+                <a:effectLst/>
+                <a:latin typeface="Calibri" panose="020F0502020204030204" pitchFamily="34" charset="0"/>
+                <a:cs typeface="Calibri" panose="020F0502020204030204" pitchFamily="34" charset="0"/>
+              </a:rPr>
+              <a:t>)=0). This allowed for very deep networks.  Almost a decade later, the </a:t>
+            </a:r>
+            <a:r>
+              <a:rPr lang="en-US" sz="1600" b="0" i="0" dirty="0" err="1">
+                <a:effectLst/>
+                <a:latin typeface="Calibri" panose="020F0502020204030204" pitchFamily="34" charset="0"/>
+                <a:cs typeface="Calibri" panose="020F0502020204030204" pitchFamily="34" charset="0"/>
+              </a:rPr>
+              <a:t>ResNet</a:t>
+            </a:r>
+            <a:r>
+              <a:rPr lang="en-US" sz="1600" b="0" i="0" dirty="0">
+                <a:effectLst/>
+                <a:latin typeface="Calibri" panose="020F0502020204030204" pitchFamily="34" charset="0"/>
+                <a:cs typeface="Calibri" panose="020F0502020204030204" pitchFamily="34" charset="0"/>
+              </a:rPr>
+              <a:t> design is still popular, a testament to its design. </a:t>
+            </a:r>
+          </a:p>
+          <a:p>
+            <a:pPr algn="just">
+              <a:lnSpc>
+                <a:spcPct val="170000"/>
+              </a:lnSpc>
+            </a:pPr>
+            <a:r>
+              <a:rPr lang="en-US" sz="1600" b="0" i="0" dirty="0">
+                <a:effectLst/>
+                <a:latin typeface="Calibri" panose="020F0502020204030204" pitchFamily="34" charset="0"/>
+                <a:cs typeface="Calibri" panose="020F0502020204030204" pitchFamily="34" charset="0"/>
+              </a:rPr>
+              <a:t>Lastly, </a:t>
+            </a:r>
+            <a:r>
+              <a:rPr lang="en-US" sz="1600" b="0" i="0" dirty="0" err="1">
+                <a:effectLst/>
+                <a:latin typeface="Calibri" panose="020F0502020204030204" pitchFamily="34" charset="0"/>
+                <a:cs typeface="Calibri" panose="020F0502020204030204" pitchFamily="34" charset="0"/>
+              </a:rPr>
+              <a:t>ResNeXt</a:t>
+            </a:r>
+            <a:r>
+              <a:rPr lang="en-US" sz="1600" b="0" i="0" dirty="0">
+                <a:effectLst/>
+                <a:latin typeface="Calibri" panose="020F0502020204030204" pitchFamily="34" charset="0"/>
+                <a:cs typeface="Calibri" panose="020F0502020204030204" pitchFamily="34" charset="0"/>
+              </a:rPr>
+              <a:t> added grouped convolutions, offering a better trade-off between parameters and computation. </a:t>
+            </a:r>
+          </a:p>
+          <a:p>
+            <a:pPr algn="just">
+              <a:lnSpc>
+                <a:spcPct val="170000"/>
+              </a:lnSpc>
+            </a:pPr>
+            <a:r>
+              <a:rPr lang="en-US" sz="1600" b="0" i="0" dirty="0">
+                <a:effectLst/>
+                <a:latin typeface="Calibri" panose="020F0502020204030204" pitchFamily="34" charset="0"/>
+                <a:cs typeface="Calibri" panose="020F0502020204030204" pitchFamily="34" charset="0"/>
+              </a:rPr>
+              <a:t>A precursor to Transformers for vision, the Squeeze-and-Excitation Networks (</a:t>
+            </a:r>
+            <a:r>
+              <a:rPr lang="en-US" sz="1600" b="0" i="0" dirty="0" err="1">
+                <a:effectLst/>
+                <a:latin typeface="Calibri" panose="020F0502020204030204" pitchFamily="34" charset="0"/>
+                <a:cs typeface="Calibri" panose="020F0502020204030204" pitchFamily="34" charset="0"/>
+              </a:rPr>
+              <a:t>SENets</a:t>
+            </a:r>
+            <a:r>
+              <a:rPr lang="en-US" sz="1600" b="0" i="0" dirty="0">
+                <a:effectLst/>
+                <a:latin typeface="Calibri" panose="020F0502020204030204" pitchFamily="34" charset="0"/>
+                <a:cs typeface="Calibri" panose="020F0502020204030204" pitchFamily="34" charset="0"/>
+              </a:rPr>
+              <a:t>) allow for efficient information transfer between locations (</a:t>
+            </a:r>
+            <a:r>
+              <a:rPr lang="en-US" sz="1600" b="0" i="0" dirty="0">
+                <a:solidFill>
+                  <a:srgbClr val="FF6E40"/>
+                </a:solidFill>
+                <a:effectLst/>
+                <a:latin typeface="Calibri" panose="020F0502020204030204" pitchFamily="34" charset="0"/>
+                <a:cs typeface="Calibri" panose="020F0502020204030204" pitchFamily="34" charset="0"/>
+                <a:hlinkClick r:id="rId2" tooltip="Hu, J., Shen, L., &amp; Sun, G. (2018). Squeeze-and-excitation networks. Proceedings of the IEEE conference on computer vision and pattern recognition (pp. 7132–7141)."/>
+              </a:rPr>
+              <a:t>Hu </a:t>
+            </a:r>
+            <a:r>
+              <a:rPr lang="en-US" sz="1600" b="0" i="1" dirty="0">
+                <a:solidFill>
+                  <a:srgbClr val="FF6E40"/>
+                </a:solidFill>
+                <a:effectLst/>
+                <a:latin typeface="Calibri" panose="020F0502020204030204" pitchFamily="34" charset="0"/>
+                <a:cs typeface="Calibri" panose="020F0502020204030204" pitchFamily="34" charset="0"/>
+                <a:hlinkClick r:id="rId2" tooltip="Hu, J., Shen, L., &amp; Sun, G. (2018). Squeeze-and-excitation networks. Proceedings of the IEEE conference on computer vision and pattern recognition (pp. 7132–7141)."/>
+              </a:rPr>
+              <a:t>et al.</a:t>
+            </a:r>
+            <a:r>
+              <a:rPr lang="en-US" sz="1600" b="0" i="0" dirty="0">
+                <a:solidFill>
+                  <a:srgbClr val="FF6E40"/>
+                </a:solidFill>
+                <a:effectLst/>
+                <a:latin typeface="Calibri" panose="020F0502020204030204" pitchFamily="34" charset="0"/>
+                <a:cs typeface="Calibri" panose="020F0502020204030204" pitchFamily="34" charset="0"/>
+                <a:hlinkClick r:id="rId2" tooltip="Hu, J., Shen, L., &amp; Sun, G. (2018). Squeeze-and-excitation networks. Proceedings of the IEEE conference on computer vision and pattern recognition (pp. 7132–7141)."/>
+              </a:rPr>
+              <a:t>, 2018</a:t>
+            </a:r>
+            <a:r>
+              <a:rPr lang="en-US" sz="1600" b="0" i="0" dirty="0">
+                <a:effectLst/>
+                <a:latin typeface="Calibri" panose="020F0502020204030204" pitchFamily="34" charset="0"/>
+                <a:cs typeface="Calibri" panose="020F0502020204030204" pitchFamily="34" charset="0"/>
+              </a:rPr>
+              <a:t>). They accomplished this by computing a per-channel global attention function.</a:t>
+            </a:r>
+            <a:endParaRPr lang="en-US" sz="1600" dirty="0">
+              <a:latin typeface="Calibri" panose="020F0502020204030204" pitchFamily="34" charset="0"/>
+              <a:cs typeface="Calibri" panose="020F0502020204030204" pitchFamily="34" charset="0"/>
+            </a:endParaRPr>
+          </a:p>
+        </p:txBody>
+      </p:sp>
+    </p:spTree>
+    <p:extLst>
+      <p:ext uri="{BB962C8B-B14F-4D97-AF65-F5344CB8AC3E}">
+        <p14:creationId xmlns:p14="http://schemas.microsoft.com/office/powerpoint/2010/main" val="933039325"/>
+      </p:ext>
+    </p:extLst>
+  </p:cSld>
+  <p:clrMapOvr>
+    <a:masterClrMapping/>
+  </p:clrMapOvr>
+</p:sld>
+</file>
+
+<file path=ppt/slides/slide11.xml><?xml version="1.0" encoding="utf-8"?>
+<p:sld xmlns:a="http://schemas.openxmlformats.org/drawingml/2006/main" xmlns:r="http://schemas.openxmlformats.org/officeDocument/2006/relationships" xmlns:p="http://schemas.openxmlformats.org/presentationml/2006/main">
+  <p:cSld>
+    <p:spTree>
+      <p:nvGrpSpPr>
+        <p:cNvPr id="1" name=""/>
+        <p:cNvGrpSpPr/>
+        <p:nvPr/>
+      </p:nvGrpSpPr>
+      <p:grpSpPr>
+        <a:xfrm>
+          <a:off x="0" y="0"/>
+          <a:ext cx="0" cy="0"/>
+          <a:chOff x="0" y="0"/>
+          <a:chExt cx="0" cy="0"/>
+        </a:xfrm>
+      </p:grpSpPr>
+      <p:sp>
+        <p:nvSpPr>
+          <p:cNvPr id="2" name="Title 1">
+            <a:extLst>
+              <a:ext uri="{FF2B5EF4-FFF2-40B4-BE49-F238E27FC236}">
+                <a16:creationId xmlns:a16="http://schemas.microsoft.com/office/drawing/2014/main" id="{82BA1F48-3656-478C-6B15-E4EAC282D4F9}"/>
+              </a:ext>
+            </a:extLst>
+          </p:cNvPr>
+          <p:cNvSpPr>
+            <a:spLocks noGrp="1"/>
+          </p:cNvSpPr>
+          <p:nvPr>
+            <p:ph type="title"/>
+          </p:nvPr>
+        </p:nvSpPr>
+        <p:spPr>
+          <a:xfrm>
+            <a:off x="225039" y="255269"/>
+            <a:ext cx="10515600" cy="851536"/>
+          </a:xfrm>
+        </p:spPr>
+        <p:txBody>
+          <a:bodyPr/>
+          <a:lstStyle/>
+          <a:p>
+            <a:r>
+              <a:rPr lang="en-US" dirty="0"/>
+              <a:t>Performance Evolution</a:t>
+            </a:r>
+          </a:p>
+        </p:txBody>
+      </p:sp>
+      <p:sp>
+        <p:nvSpPr>
+          <p:cNvPr id="3" name="Content Placeholder 2">
+            <a:extLst>
+              <a:ext uri="{FF2B5EF4-FFF2-40B4-BE49-F238E27FC236}">
+                <a16:creationId xmlns:a16="http://schemas.microsoft.com/office/drawing/2014/main" id="{C323C4D1-CB24-C937-9653-8CEB451EDAB2}"/>
+              </a:ext>
+            </a:extLst>
+          </p:cNvPr>
+          <p:cNvSpPr>
+            <a:spLocks noGrp="1"/>
+          </p:cNvSpPr>
+          <p:nvPr>
+            <p:ph idx="1"/>
+          </p:nvPr>
+        </p:nvSpPr>
+        <p:spPr/>
+        <p:txBody>
+          <a:bodyPr/>
+          <a:lstStyle/>
+          <a:p>
+            <a:endParaRPr lang="en-US"/>
+          </a:p>
+        </p:txBody>
+      </p:sp>
+      <p:pic>
+        <p:nvPicPr>
+          <p:cNvPr id="4" name="Picture 3">
+            <a:extLst>
+              <a:ext uri="{FF2B5EF4-FFF2-40B4-BE49-F238E27FC236}">
+                <a16:creationId xmlns:a16="http://schemas.microsoft.com/office/drawing/2014/main" id="{30C8D964-73C8-577C-9789-78EB0C84978C}"/>
+              </a:ext>
+            </a:extLst>
+          </p:cNvPr>
+          <p:cNvPicPr>
+            <a:picLocks noChangeAspect="1"/>
+          </p:cNvPicPr>
+          <p:nvPr/>
+        </p:nvPicPr>
+        <p:blipFill>
+          <a:blip r:embed="rId2"/>
+          <a:stretch>
+            <a:fillRect/>
+          </a:stretch>
+        </p:blipFill>
+        <p:spPr>
+          <a:xfrm>
+            <a:off x="6709162" y="72073"/>
+            <a:ext cx="4564720" cy="2470319"/>
+          </a:xfrm>
+          <a:prstGeom prst="rect">
+            <a:avLst/>
+          </a:prstGeom>
+        </p:spPr>
+      </p:pic>
+      <p:pic>
+        <p:nvPicPr>
+          <p:cNvPr id="5" name="Picture 4">
+            <a:extLst>
+              <a:ext uri="{FF2B5EF4-FFF2-40B4-BE49-F238E27FC236}">
+                <a16:creationId xmlns:a16="http://schemas.microsoft.com/office/drawing/2014/main" id="{823CB2EB-711C-3AE4-CC36-617C41D8E2BB}"/>
+              </a:ext>
+            </a:extLst>
+          </p:cNvPr>
+          <p:cNvPicPr>
+            <a:picLocks noChangeAspect="1"/>
+          </p:cNvPicPr>
+          <p:nvPr/>
+        </p:nvPicPr>
+        <p:blipFill>
+          <a:blip r:embed="rId3"/>
+          <a:stretch>
+            <a:fillRect/>
+          </a:stretch>
+        </p:blipFill>
+        <p:spPr>
+          <a:xfrm>
+            <a:off x="3793273" y="2835444"/>
+            <a:ext cx="7772400" cy="3950483"/>
+          </a:xfrm>
+          <a:prstGeom prst="rect">
+            <a:avLst/>
+          </a:prstGeom>
+        </p:spPr>
+      </p:pic>
+    </p:spTree>
+    <p:extLst>
+      <p:ext uri="{BB962C8B-B14F-4D97-AF65-F5344CB8AC3E}">
+        <p14:creationId xmlns:p14="http://schemas.microsoft.com/office/powerpoint/2010/main" val="2586876088"/>
+      </p:ext>
+    </p:extLst>
+  </p:cSld>
+  <p:clrMapOvr>
+    <a:masterClrMapping/>
+  </p:clrMapOvr>
+</p:sld>
+</file>
+
+<file path=ppt/slides/slide12.xml><?xml version="1.0" encoding="utf-8"?>
+<p:sld xmlns:a="http://schemas.openxmlformats.org/drawingml/2006/main" xmlns:r="http://schemas.openxmlformats.org/officeDocument/2006/relationships" xmlns:p="http://schemas.openxmlformats.org/presentationml/2006/main">
+  <p:cSld>
+    <p:spTree>
+      <p:nvGrpSpPr>
+        <p:cNvPr id="1" name=""/>
+        <p:cNvGrpSpPr/>
+        <p:nvPr/>
+      </p:nvGrpSpPr>
+      <p:grpSpPr>
+        <a:xfrm>
+          <a:off x="0" y="0"/>
+          <a:ext cx="0" cy="0"/>
+          <a:chOff x="0" y="0"/>
+          <a:chExt cx="0" cy="0"/>
+        </a:xfrm>
+      </p:grpSpPr>
+      <p:sp>
+        <p:nvSpPr>
+          <p:cNvPr id="2" name="Title 1">
+            <a:extLst>
+              <a:ext uri="{FF2B5EF4-FFF2-40B4-BE49-F238E27FC236}">
+                <a16:creationId xmlns:a16="http://schemas.microsoft.com/office/drawing/2014/main" id="{5501B95D-88BA-42F0-436D-40F53DBDA6E6}"/>
+              </a:ext>
+            </a:extLst>
+          </p:cNvPr>
+          <p:cNvSpPr>
+            <a:spLocks noGrp="1"/>
+          </p:cNvSpPr>
+          <p:nvPr>
+            <p:ph type="title"/>
+          </p:nvPr>
+        </p:nvSpPr>
+        <p:spPr>
+          <a:xfrm>
+            <a:off x="325244" y="317189"/>
+            <a:ext cx="10515600" cy="727695"/>
+          </a:xfrm>
+        </p:spPr>
+        <p:txBody>
+          <a:bodyPr/>
+          <a:lstStyle/>
+          <a:p>
+            <a:r>
+              <a:rPr lang="en-US" dirty="0"/>
+              <a:t>Designing CNN architectures </a:t>
+            </a:r>
+          </a:p>
+        </p:txBody>
+      </p:sp>
+      <p:sp>
+        <p:nvSpPr>
+          <p:cNvPr id="3" name="Content Placeholder 2">
+            <a:extLst>
+              <a:ext uri="{FF2B5EF4-FFF2-40B4-BE49-F238E27FC236}">
+                <a16:creationId xmlns:a16="http://schemas.microsoft.com/office/drawing/2014/main" id="{B0D681CC-3A4B-F268-D974-FC1C85B85BAA}"/>
+              </a:ext>
+            </a:extLst>
+          </p:cNvPr>
+          <p:cNvSpPr>
+            <a:spLocks noGrp="1"/>
+          </p:cNvSpPr>
+          <p:nvPr>
+            <p:ph idx="1"/>
+          </p:nvPr>
+        </p:nvSpPr>
+        <p:spPr>
+          <a:xfrm>
+            <a:off x="726687" y="5820125"/>
+            <a:ext cx="10515600" cy="727695"/>
+          </a:xfrm>
+        </p:spPr>
+        <p:txBody>
+          <a:bodyPr>
+            <a:normAutofit fontScale="47500" lnSpcReduction="20000"/>
+          </a:bodyPr>
+          <a:lstStyle/>
+          <a:p>
+            <a:pPr marL="0" indent="0">
+              <a:lnSpc>
+                <a:spcPct val="170000"/>
+              </a:lnSpc>
+              <a:buNone/>
+            </a:pPr>
+            <a:r>
+              <a:rPr lang="en-US" b="0" i="0" dirty="0" err="1">
+                <a:effectLst/>
+                <a:latin typeface="Roboto" panose="02000000000000000000" pitchFamily="2" charset="0"/>
+              </a:rPr>
+              <a:t>Radosavovic</a:t>
+            </a:r>
+            <a:r>
+              <a:rPr lang="en-US" b="0" i="0" dirty="0">
+                <a:effectLst/>
+                <a:latin typeface="Roboto" panose="02000000000000000000" pitchFamily="2" charset="0"/>
+              </a:rPr>
+              <a:t>, I., </a:t>
+            </a:r>
+            <a:r>
+              <a:rPr lang="en-US" b="0" i="0" dirty="0" err="1">
+                <a:effectLst/>
+                <a:latin typeface="Roboto" panose="02000000000000000000" pitchFamily="2" charset="0"/>
+              </a:rPr>
+              <a:t>Kosaraju</a:t>
+            </a:r>
+            <a:r>
+              <a:rPr lang="en-US" b="0" i="0" dirty="0">
+                <a:effectLst/>
+                <a:latin typeface="Roboto" panose="02000000000000000000" pitchFamily="2" charset="0"/>
+              </a:rPr>
+              <a:t>, R. P., </a:t>
+            </a:r>
+            <a:r>
+              <a:rPr lang="en-US" b="0" i="0" dirty="0" err="1">
+                <a:effectLst/>
+                <a:latin typeface="Roboto" panose="02000000000000000000" pitchFamily="2" charset="0"/>
+              </a:rPr>
+              <a:t>Girshick</a:t>
+            </a:r>
+            <a:r>
+              <a:rPr lang="en-US" b="0" i="0" dirty="0">
+                <a:effectLst/>
+                <a:latin typeface="Roboto" panose="02000000000000000000" pitchFamily="2" charset="0"/>
+              </a:rPr>
+              <a:t>, R., He, K., &amp; </a:t>
+            </a:r>
+            <a:r>
+              <a:rPr lang="en-US" b="0" i="0" dirty="0" err="1">
+                <a:effectLst/>
+                <a:latin typeface="Roboto" panose="02000000000000000000" pitchFamily="2" charset="0"/>
+              </a:rPr>
+              <a:t>Dollár</a:t>
+            </a:r>
+            <a:r>
+              <a:rPr lang="en-US" b="0" i="0" dirty="0">
+                <a:effectLst/>
+                <a:latin typeface="Roboto" panose="02000000000000000000" pitchFamily="2" charset="0"/>
+              </a:rPr>
+              <a:t>, P. (2020). </a:t>
+            </a:r>
+            <a:r>
+              <a:rPr lang="en-US" b="0" i="0" dirty="0">
+                <a:effectLst/>
+                <a:latin typeface="Roboto" panose="02000000000000000000" pitchFamily="2" charset="0"/>
+                <a:hlinkClick r:id="rId2"/>
+              </a:rPr>
+              <a:t>Designing network design spaces</a:t>
+            </a:r>
+            <a:r>
+              <a:rPr lang="en-US" b="0" i="0" dirty="0">
+                <a:effectLst/>
+                <a:latin typeface="Roboto" panose="02000000000000000000" pitchFamily="2" charset="0"/>
+              </a:rPr>
+              <a:t>. </a:t>
+            </a:r>
+            <a:r>
+              <a:rPr lang="en-US" b="0" i="1" dirty="0">
+                <a:effectLst/>
+                <a:latin typeface="Roboto" panose="02000000000000000000" pitchFamily="2" charset="0"/>
+              </a:rPr>
+              <a:t>Proceedings of the IEEE/CVF Conference on Computer Vision and Pattern Recognition</a:t>
+            </a:r>
+            <a:r>
+              <a:rPr lang="en-US" b="0" i="0" dirty="0">
+                <a:effectLst/>
+                <a:latin typeface="Roboto" panose="02000000000000000000" pitchFamily="2" charset="0"/>
+              </a:rPr>
+              <a:t> (pp. 10428–10436).</a:t>
+            </a:r>
+            <a:endParaRPr lang="en-US" dirty="0"/>
+          </a:p>
+        </p:txBody>
+      </p:sp>
+      <p:pic>
+        <p:nvPicPr>
+          <p:cNvPr id="4" name="Picture 3">
+            <a:extLst>
+              <a:ext uri="{FF2B5EF4-FFF2-40B4-BE49-F238E27FC236}">
+                <a16:creationId xmlns:a16="http://schemas.microsoft.com/office/drawing/2014/main" id="{1210B6BD-D30E-0F2D-5835-CA8269CD4174}"/>
+              </a:ext>
+            </a:extLst>
+          </p:cNvPr>
+          <p:cNvPicPr>
+            <a:picLocks noChangeAspect="1"/>
+          </p:cNvPicPr>
+          <p:nvPr/>
+        </p:nvPicPr>
+        <p:blipFill>
+          <a:blip r:embed="rId3"/>
+          <a:stretch>
+            <a:fillRect/>
+          </a:stretch>
+        </p:blipFill>
+        <p:spPr>
+          <a:xfrm>
+            <a:off x="1793643" y="1253331"/>
+            <a:ext cx="7807557" cy="4179954"/>
+          </a:xfrm>
+          <a:prstGeom prst="rect">
+            <a:avLst/>
+          </a:prstGeom>
+        </p:spPr>
+      </p:pic>
+    </p:spTree>
+    <p:extLst>
+      <p:ext uri="{BB962C8B-B14F-4D97-AF65-F5344CB8AC3E}">
+        <p14:creationId xmlns:p14="http://schemas.microsoft.com/office/powerpoint/2010/main" val="3536443550"/>
+      </p:ext>
+    </p:extLst>
+  </p:cSld>
+  <p:clrMapOvr>
+    <a:masterClrMapping/>
+  </p:clrMapOvr>
+</p:sld>
+</file>
+
 <file path=ppt/slides/slide2.xml><?xml version="1.0" encoding="utf-8"?>
 <p:sld xmlns:a="http://schemas.openxmlformats.org/drawingml/2006/main" xmlns:r="http://schemas.openxmlformats.org/officeDocument/2006/relationships" xmlns:p="http://schemas.openxmlformats.org/presentationml/2006/main">
   <p:cSld>
@@ -3459,12 +4225,42 @@
             <p:ph idx="1"/>
           </p:nvPr>
         </p:nvSpPr>
-        <p:spPr/>
-        <p:txBody>
-          <a:bodyPr/>
-          <a:lstStyle/>
-          <a:p>
-            <a:endParaRPr lang="en-US"/>
+        <p:spPr>
+          <a:xfrm>
+            <a:off x="838200" y="1825625"/>
+            <a:ext cx="5712069" cy="4351338"/>
+          </a:xfrm>
+        </p:spPr>
+        <p:txBody>
+          <a:bodyPr>
+            <a:normAutofit/>
+          </a:bodyPr>
+          <a:lstStyle/>
+          <a:p>
+            <a:r>
+              <a:rPr lang="en-US" sz="1800" dirty="0"/>
+              <a:t>Deeper and wider </a:t>
+            </a:r>
+          </a:p>
+          <a:p>
+            <a:r>
+              <a:rPr lang="en-US" sz="1800" dirty="0"/>
+              <a:t>Uses </a:t>
+            </a:r>
+            <a:r>
+              <a:rPr lang="en-US" sz="1800" dirty="0" err="1"/>
+              <a:t>ReLu</a:t>
+            </a:r>
+            <a:r>
+              <a:rPr lang="en-US" sz="1800" dirty="0"/>
+              <a:t> (non linearity after convolution)</a:t>
+            </a:r>
+          </a:p>
+          <a:p>
+            <a:r>
+              <a:rPr lang="en-US" sz="1800" dirty="0"/>
+              <a:t>Uses dropout </a:t>
+            </a:r>
           </a:p>
         </p:txBody>
       </p:sp>
@@ -3572,10 +4368,44 @@
             <p:ph idx="1"/>
           </p:nvPr>
         </p:nvSpPr>
-        <p:spPr/>
-        <p:txBody>
-          <a:bodyPr/>
-          <a:lstStyle/>
+        <p:spPr>
+          <a:xfrm>
+            <a:off x="838200" y="1825625"/>
+            <a:ext cx="4324815" cy="4351338"/>
+          </a:xfrm>
+        </p:spPr>
+        <p:txBody>
+          <a:bodyPr/>
+          <a:lstStyle/>
+          <a:p>
+            <a:r>
+              <a:rPr lang="en-US" sz="2000" dirty="0"/>
+              <a:t>Deeper and thinner</a:t>
+            </a:r>
+          </a:p>
+          <a:p>
+            <a:r>
+              <a:rPr lang="en-US" sz="2000" dirty="0"/>
+              <a:t>Uses </a:t>
+            </a:r>
+            <a:r>
+              <a:rPr lang="en-US" sz="2000" dirty="0" err="1"/>
+              <a:t>ReLu</a:t>
+            </a:r>
+            <a:r>
+              <a:rPr lang="en-US" sz="2000" dirty="0"/>
+              <a:t> (non linearity after convolution)</a:t>
+            </a:r>
+          </a:p>
+          <a:p>
+            <a:r>
+              <a:rPr lang="en-US" sz="2000" dirty="0"/>
+              <a:t>Uses dropout </a:t>
+            </a:r>
+          </a:p>
+          <a:p>
+            <a:endParaRPr lang="en-US" sz="2000" dirty="0"/>
+          </a:p>
           <a:p>
             <a:endParaRPr lang="en-US" dirty="0"/>
           </a:p>
@@ -3686,12 +4516,48 @@
             <p:ph idx="1"/>
           </p:nvPr>
         </p:nvSpPr>
-        <p:spPr/>
-        <p:txBody>
-          <a:bodyPr/>
-          <a:lstStyle/>
-          <a:p>
-            <a:endParaRPr lang="en-US"/>
+        <p:spPr>
+          <a:xfrm>
+            <a:off x="838200" y="1825625"/>
+            <a:ext cx="3711498" cy="4351338"/>
+          </a:xfrm>
+        </p:spPr>
+        <p:txBody>
+          <a:bodyPr>
+            <a:normAutofit/>
+          </a:bodyPr>
+          <a:lstStyle/>
+          <a:p>
+            <a:r>
+              <a:rPr lang="en-US" sz="1800" dirty="0"/>
+              <a:t>Introducing the 1x1 Convolution </a:t>
+            </a:r>
+          </a:p>
+          <a:p>
+            <a:r>
+              <a:rPr lang="en-US" sz="1800" dirty="0"/>
+              <a:t>Removes the FC layers </a:t>
+            </a:r>
+          </a:p>
+          <a:p>
+            <a:r>
+              <a:rPr lang="en-US" sz="1800" dirty="0"/>
+              <a:t>Uses </a:t>
+            </a:r>
+            <a:r>
+              <a:rPr lang="en-US" sz="1800" dirty="0" err="1"/>
+              <a:t>ReLu</a:t>
+            </a:r>
+            <a:r>
+              <a:rPr lang="en-US" sz="1800" dirty="0"/>
+              <a:t> (non linearity after convolution)</a:t>
+            </a:r>
+          </a:p>
+          <a:p>
+            <a:r>
+              <a:rPr lang="en-US" sz="1800" dirty="0"/>
+              <a:t>Uses dropout</a:t>
+            </a:r>
           </a:p>
         </p:txBody>
       </p:sp>
@@ -3807,12 +4673,55 @@
             <p:ph idx="1"/>
           </p:nvPr>
         </p:nvSpPr>
-        <p:spPr/>
-        <p:txBody>
-          <a:bodyPr/>
-          <a:lstStyle/>
-          <a:p>
-            <a:endParaRPr lang="en-US"/>
+        <p:spPr>
+          <a:xfrm>
+            <a:off x="345013" y="1433307"/>
+            <a:ext cx="4650733" cy="4644107"/>
+          </a:xfrm>
+        </p:spPr>
+        <p:txBody>
+          <a:bodyPr/>
+          <a:lstStyle/>
+          <a:p>
+            <a:r>
+              <a:rPr lang="en-US" dirty="0"/>
+              <a:t>Inception block:</a:t>
+            </a:r>
+          </a:p>
+          <a:p>
+            <a:pPr lvl="1"/>
+            <a:r>
+              <a:rPr lang="en-US" dirty="0"/>
+              <a:t>Multiple-views on low level features </a:t>
+            </a:r>
+          </a:p>
+          <a:p>
+            <a:r>
+              <a:rPr lang="en-US" dirty="0"/>
+              <a:t>Uses </a:t>
+            </a:r>
+            <a:r>
+              <a:rPr lang="en-US" dirty="0" err="1"/>
+              <a:t>ReLu</a:t>
+            </a:r>
+            <a:endParaRPr lang="en-US" dirty="0"/>
+          </a:p>
+          <a:p>
+            <a:r>
+              <a:rPr lang="en-US" dirty="0"/>
+              <a:t>Uses </a:t>
+            </a:r>
+            <a:r>
+              <a:rPr lang="en-US" dirty="0" err="1"/>
+              <a:t>MaxPooling</a:t>
+            </a:r>
+            <a:endParaRPr lang="en-US" dirty="0"/>
+          </a:p>
+          <a:p>
+            <a:r>
+              <a:rPr lang="en-US" dirty="0"/>
+              <a:t>No dropout ! </a:t>
+            </a:r>
           </a:p>
         </p:txBody>
       </p:sp>
@@ -3838,7 +4747,7 @@
         </p:blipFill>
         <p:spPr>
           <a:xfrm>
-            <a:off x="5929746" y="1027906"/>
+            <a:off x="6589188" y="681037"/>
             <a:ext cx="4572000" cy="1638300"/>
           </a:xfrm>
           <a:prstGeom prst="rect">
@@ -3868,7 +4777,7 @@
         </p:blipFill>
         <p:spPr>
           <a:xfrm>
-            <a:off x="3641437" y="3081045"/>
+            <a:off x="4087486" y="3147952"/>
             <a:ext cx="7712363" cy="3230855"/>
           </a:xfrm>
           <a:prstGeom prst="rect">
@@ -4092,6 +5001,122 @@
           <p:cNvPr id="2" name="Title 1">
             <a:extLst>
               <a:ext uri="{FF2B5EF4-FFF2-40B4-BE49-F238E27FC236}">
+                <a16:creationId xmlns:a16="http://schemas.microsoft.com/office/drawing/2014/main" id="{C16668E7-DF63-1295-3430-724F3CE576DF}"/>
+              </a:ext>
+            </a:extLst>
+          </p:cNvPr>
+          <p:cNvSpPr>
+            <a:spLocks noGrp="1"/>
+          </p:cNvSpPr>
+          <p:nvPr>
+            <p:ph type="title"/>
+          </p:nvPr>
+        </p:nvSpPr>
+        <p:spPr/>
+        <p:txBody>
+          <a:bodyPr/>
+          <a:lstStyle/>
+          <a:p>
+            <a:r>
+              <a:rPr lang="en-US" dirty="0" err="1"/>
+              <a:t>ResNet</a:t>
+            </a:r>
+            <a:endParaRPr lang="en-US" dirty="0"/>
+          </a:p>
+        </p:txBody>
+      </p:sp>
+      <p:sp>
+        <p:nvSpPr>
+          <p:cNvPr id="3" name="Content Placeholder 2">
+            <a:extLst>
+              <a:ext uri="{FF2B5EF4-FFF2-40B4-BE49-F238E27FC236}">
+                <a16:creationId xmlns:a16="http://schemas.microsoft.com/office/drawing/2014/main" id="{1853FF0F-EDCD-F2C4-5B95-10D18781F7B7}"/>
+              </a:ext>
+            </a:extLst>
+          </p:cNvPr>
+          <p:cNvSpPr>
+            <a:spLocks noGrp="1"/>
+          </p:cNvSpPr>
+          <p:nvPr>
+            <p:ph idx="1"/>
+          </p:nvPr>
+        </p:nvSpPr>
+        <p:spPr/>
+        <p:txBody>
+          <a:bodyPr/>
+          <a:lstStyle/>
+          <a:p>
+            <a:r>
+              <a:rPr lang="en-US" dirty="0"/>
+              <a:t>Residual block:</a:t>
+            </a:r>
+          </a:p>
+          <a:p>
+            <a:pPr lvl="1"/>
+            <a:r>
+              <a:rPr lang="en-US" dirty="0"/>
+              <a:t>Boosting like mechanism </a:t>
+            </a:r>
+          </a:p>
+          <a:p>
+            <a:r>
+              <a:rPr lang="en-US" dirty="0"/>
+              <a:t>Uses </a:t>
+            </a:r>
+            <a:r>
+              <a:rPr lang="en-US" dirty="0" err="1"/>
+              <a:t>ReLU</a:t>
+            </a:r>
+            <a:endParaRPr lang="en-US" dirty="0"/>
+          </a:p>
+          <a:p>
+            <a:r>
+              <a:rPr lang="en-US" dirty="0"/>
+              <a:t>Uses </a:t>
+            </a:r>
+            <a:r>
+              <a:rPr lang="en-US" dirty="0" err="1"/>
+              <a:t>BatchNormalization</a:t>
+            </a:r>
+            <a:endParaRPr lang="en-US" dirty="0"/>
+          </a:p>
+        </p:txBody>
+      </p:sp>
+    </p:spTree>
+    <p:extLst>
+      <p:ext uri="{BB962C8B-B14F-4D97-AF65-F5344CB8AC3E}">
+        <p14:creationId xmlns:p14="http://schemas.microsoft.com/office/powerpoint/2010/main" val="1162284137"/>
+      </p:ext>
+    </p:extLst>
+  </p:cSld>
+  <p:clrMapOvr>
+    <a:masterClrMapping/>
+  </p:clrMapOvr>
+</p:sld>
+</file>
+
+<file path=ppt/slides/slide8.xml><?xml version="1.0" encoding="utf-8"?>
+<p:sld xmlns:a="http://schemas.openxmlformats.org/drawingml/2006/main" xmlns:r="http://schemas.openxmlformats.org/officeDocument/2006/relationships" xmlns:p="http://schemas.openxmlformats.org/presentationml/2006/main">
+  <p:cSld>
+    <p:spTree>
+      <p:nvGrpSpPr>
+        <p:cNvPr id="1" name=""/>
+        <p:cNvGrpSpPr/>
+        <p:nvPr/>
+      </p:nvGrpSpPr>
+      <p:grpSpPr>
+        <a:xfrm>
+          <a:off x="0" y="0"/>
+          <a:ext cx="0" cy="0"/>
+          <a:chOff x="0" y="0"/>
+          <a:chExt cx="0" cy="0"/>
+        </a:xfrm>
+      </p:grpSpPr>
+      <p:sp>
+        <p:nvSpPr>
+          <p:cNvPr id="2" name="Title 1">
+            <a:extLst>
+              <a:ext uri="{FF2B5EF4-FFF2-40B4-BE49-F238E27FC236}">
                 <a16:creationId xmlns:a16="http://schemas.microsoft.com/office/drawing/2014/main" id="{1A8C425F-F07A-49C1-0037-B83ACD487255}"/>
               </a:ext>
             </a:extLst>
@@ -4139,12 +5164,30 @@
             <p:ph idx="1"/>
           </p:nvPr>
         </p:nvSpPr>
-        <p:spPr/>
-        <p:txBody>
-          <a:bodyPr/>
-          <a:lstStyle/>
-          <a:p>
-            <a:endParaRPr lang="en-US"/>
+        <p:spPr>
+          <a:xfrm>
+            <a:off x="470210" y="1502426"/>
+            <a:ext cx="3923370" cy="4351338"/>
+          </a:xfrm>
+        </p:spPr>
+        <p:txBody>
+          <a:bodyPr>
+            <a:normAutofit/>
+          </a:bodyPr>
+          <a:lstStyle/>
+          <a:p>
+            <a:r>
+              <a:rPr lang="en-US" sz="1800" dirty="0"/>
+              <a:t>The </a:t>
+            </a:r>
+            <a:r>
+              <a:rPr lang="en-US" sz="1800" dirty="0" err="1"/>
+              <a:t>ResNeXt</a:t>
+            </a:r>
+            <a:r>
+              <a:rPr lang="en-US" sz="1800" dirty="0"/>
+              <a:t> borrows the inception block multi-views </a:t>
+            </a:r>
           </a:p>
         </p:txBody>
       </p:sp>
@@ -4170,8 +5213,8 @@
         </p:blipFill>
         <p:spPr>
           <a:xfrm>
-            <a:off x="2049895" y="1402065"/>
-            <a:ext cx="8479560" cy="4774898"/>
+            <a:off x="5092823" y="1290646"/>
+            <a:ext cx="6896596" cy="3883520"/>
           </a:xfrm>
           <a:prstGeom prst="rect">
             <a:avLst/>
@@ -4191,7 +5234,7 @@
 </p:sld>
 </file>
 
-<file path=ppt/slides/slide8.xml><?xml version="1.0" encoding="utf-8"?>
+<file path=ppt/slides/slide9.xml><?xml version="1.0" encoding="utf-8"?>
 <p:sld xmlns:a="http://schemas.openxmlformats.org/drawingml/2006/main" xmlns:r="http://schemas.openxmlformats.org/officeDocument/2006/relationships" xmlns:p="http://schemas.openxmlformats.org/presentationml/2006/main">
   <p:cSld>
     <p:spTree>

</xml_diff>